<commit_message>
nächste Version vom Text, erweitert
</commit_message>
<xml_diff>
--- a/ohdm_datenmodell/data.pptx
+++ b/ohdm_datenmodell/data.pptx
@@ -198,7 +198,7 @@
           <a:p>
             <a:fld id="{E98F6DAA-CA19-D642-8FF0-E124EB4C9217}" type="datetimeFigureOut">
               <a:rPr lang="en-US" smtClean="0"/>
-              <a:t>11/14/17</a:t>
+              <a:t>11/21/17</a:t>
             </a:fld>
             <a:endParaRPr lang="en-US"/>
           </a:p>
@@ -681,7 +681,7 @@
           <a:p>
             <a:fld id="{62D77669-92AC-7945-8A6A-9321FEC7A95F}" type="datetimeFigureOut">
               <a:rPr lang="en-US" smtClean="0"/>
-              <a:t>11/14/17</a:t>
+              <a:t>11/21/17</a:t>
             </a:fld>
             <a:endParaRPr lang="en-US"/>
           </a:p>
@@ -846,7 +846,7 @@
           <a:p>
             <a:fld id="{62D77669-92AC-7945-8A6A-9321FEC7A95F}" type="datetimeFigureOut">
               <a:rPr lang="en-US" smtClean="0"/>
-              <a:t>11/14/17</a:t>
+              <a:t>11/21/17</a:t>
             </a:fld>
             <a:endParaRPr lang="en-US"/>
           </a:p>
@@ -1021,7 +1021,7 @@
           <a:p>
             <a:fld id="{62D77669-92AC-7945-8A6A-9321FEC7A95F}" type="datetimeFigureOut">
               <a:rPr lang="en-US" smtClean="0"/>
-              <a:t>11/14/17</a:t>
+              <a:t>11/21/17</a:t>
             </a:fld>
             <a:endParaRPr lang="en-US"/>
           </a:p>
@@ -1186,7 +1186,7 @@
           <a:p>
             <a:fld id="{62D77669-92AC-7945-8A6A-9321FEC7A95F}" type="datetimeFigureOut">
               <a:rPr lang="en-US" smtClean="0"/>
-              <a:t>11/14/17</a:t>
+              <a:t>11/21/17</a:t>
             </a:fld>
             <a:endParaRPr lang="en-US"/>
           </a:p>
@@ -1425,7 +1425,7 @@
           <a:p>
             <a:fld id="{62D77669-92AC-7945-8A6A-9321FEC7A95F}" type="datetimeFigureOut">
               <a:rPr lang="en-US" smtClean="0"/>
-              <a:t>11/14/17</a:t>
+              <a:t>11/21/17</a:t>
             </a:fld>
             <a:endParaRPr lang="en-US"/>
           </a:p>
@@ -1652,7 +1652,7 @@
           <a:p>
             <a:fld id="{62D77669-92AC-7945-8A6A-9321FEC7A95F}" type="datetimeFigureOut">
               <a:rPr lang="en-US" smtClean="0"/>
-              <a:t>11/14/17</a:t>
+              <a:t>11/21/17</a:t>
             </a:fld>
             <a:endParaRPr lang="en-US"/>
           </a:p>
@@ -2014,7 +2014,7 @@
           <a:p>
             <a:fld id="{62D77669-92AC-7945-8A6A-9321FEC7A95F}" type="datetimeFigureOut">
               <a:rPr lang="en-US" smtClean="0"/>
-              <a:t>11/14/17</a:t>
+              <a:t>11/21/17</a:t>
             </a:fld>
             <a:endParaRPr lang="en-US"/>
           </a:p>
@@ -2127,7 +2127,7 @@
           <a:p>
             <a:fld id="{62D77669-92AC-7945-8A6A-9321FEC7A95F}" type="datetimeFigureOut">
               <a:rPr lang="en-US" smtClean="0"/>
-              <a:t>11/14/17</a:t>
+              <a:t>11/21/17</a:t>
             </a:fld>
             <a:endParaRPr lang="en-US"/>
           </a:p>
@@ -2217,7 +2217,7 @@
           <a:p>
             <a:fld id="{62D77669-92AC-7945-8A6A-9321FEC7A95F}" type="datetimeFigureOut">
               <a:rPr lang="en-US" smtClean="0"/>
-              <a:t>11/14/17</a:t>
+              <a:t>11/21/17</a:t>
             </a:fld>
             <a:endParaRPr lang="en-US"/>
           </a:p>
@@ -2489,7 +2489,7 @@
           <a:p>
             <a:fld id="{62D77669-92AC-7945-8A6A-9321FEC7A95F}" type="datetimeFigureOut">
               <a:rPr lang="en-US" smtClean="0"/>
-              <a:t>11/14/17</a:t>
+              <a:t>11/21/17</a:t>
             </a:fld>
             <a:endParaRPr lang="en-US"/>
           </a:p>
@@ -2741,7 +2741,7 @@
           <a:p>
             <a:fld id="{62D77669-92AC-7945-8A6A-9321FEC7A95F}" type="datetimeFigureOut">
               <a:rPr lang="en-US" smtClean="0"/>
-              <a:t>11/14/17</a:t>
+              <a:t>11/21/17</a:t>
             </a:fld>
             <a:endParaRPr lang="en-US"/>
           </a:p>
@@ -2949,7 +2949,7 @@
           <a:p>
             <a:fld id="{62D77669-92AC-7945-8A6A-9321FEC7A95F}" type="datetimeFigureOut">
               <a:rPr lang="en-US" smtClean="0"/>
-              <a:t>11/14/17</a:t>
+              <a:t>11/21/17</a:t>
             </a:fld>
             <a:endParaRPr lang="en-US"/>
           </a:p>
@@ -3825,11 +3825,6 @@
               </a:rPr>
               <a:t>DB</a:t>
             </a:r>
-            <a:endParaRPr lang="en-US" sz="2800" dirty="0">
-              <a:solidFill>
-                <a:schemeClr val="tx1"/>
-              </a:solidFill>
-            </a:endParaRPr>
           </a:p>
         </p:txBody>
       </p:sp>
@@ -3882,7 +3877,7 @@
                   </a:outerShdw>
                 </a:effectLst>
               </a:rPr>
-              <a:t>Editor</a:t>
+              <a:t>OSM</a:t>
             </a:r>
             <a:endParaRPr lang="en-US" sz="1600" dirty="0">
               <a:ln w="0"/>
@@ -3949,7 +3944,7 @@
                   </a:outerShdw>
                 </a:effectLst>
               </a:rPr>
-              <a:t>Manual</a:t>
+              <a:t>Editor</a:t>
             </a:r>
             <a:endParaRPr lang="en-US" sz="1600" dirty="0">
               <a:ln w="0"/>
@@ -4016,7 +4011,7 @@
                   </a:outerShdw>
                 </a:effectLst>
               </a:rPr>
-              <a:t>Editor</a:t>
+              <a:t>Manuel</a:t>
             </a:r>
             <a:endParaRPr lang="en-US" dirty="0">
               <a:ln w="0"/>
@@ -4702,11 +4697,6 @@
               </a:rPr>
               <a:t>DB</a:t>
             </a:r>
-            <a:endParaRPr lang="en-US" sz="2800" dirty="0">
-              <a:solidFill>
-                <a:schemeClr val="tx1"/>
-              </a:solidFill>
-            </a:endParaRPr>
           </a:p>
         </p:txBody>
       </p:sp>
@@ -5116,7 +5106,7 @@
         </p:blipFill>
         <p:spPr>
           <a:xfrm>
-            <a:off x="7564854" y="5519482"/>
+            <a:off x="7602562" y="5519482"/>
             <a:ext cx="743077" cy="743077"/>
           </a:xfrm>
           <a:prstGeom prst="rect">

</xml_diff>